<commit_message>
doc: server url update
</commit_message>
<xml_diff>
--- a/docs/admin/從零開始在系網主機新增以-React-App-為前端的-WordPress-網站.pptx
+++ b/docs/admin/從零開始在系網主機新增以-React-App-為前端的-WordPress-網站.pptx
@@ -267,7 +267,7 @@
           <a:p>
             <a:fld id="{BE8C7D4D-76D2-4EDB-B4F0-48A656172D63}" type="datetimeFigureOut">
               <a:rPr lang="zh-TW" altLang="en-US" smtClean="0"/>
-              <a:t>2021/7/9</a:t>
+              <a:t>2021/12/20</a:t>
             </a:fld>
             <a:endParaRPr lang="zh-TW" altLang="en-US"/>
           </a:p>
@@ -681,7 +681,7 @@
           <a:p>
             <a:fld id="{4520454E-A1CA-4149-9698-78C9D2F963FC}" type="datetime1">
               <a:rPr lang="zh-TW" altLang="en-US" smtClean="0"/>
-              <a:t>2021/7/9</a:t>
+              <a:t>2021/12/20</a:t>
             </a:fld>
             <a:endParaRPr lang="zh-TW" altLang="en-US"/>
           </a:p>
@@ -890,7 +890,7 @@
           <a:p>
             <a:fld id="{EC0C13A6-DAA8-4294-A02F-699A307D506A}" type="datetime1">
               <a:rPr lang="zh-TW" altLang="en-US" smtClean="0"/>
-              <a:t>2021/7/9</a:t>
+              <a:t>2021/12/20</a:t>
             </a:fld>
             <a:endParaRPr lang="zh-TW" altLang="en-US"/>
           </a:p>
@@ -1098,7 +1098,7 @@
           <a:p>
             <a:fld id="{89CA3A16-E0EF-495F-882B-F705A29DC8EC}" type="datetime1">
               <a:rPr lang="zh-TW" altLang="en-US" smtClean="0"/>
-              <a:t>2021/7/9</a:t>
+              <a:t>2021/12/20</a:t>
             </a:fld>
             <a:endParaRPr lang="zh-TW" altLang="en-US"/>
           </a:p>
@@ -1334,7 +1334,7 @@
           <a:p>
             <a:fld id="{C2D56FB9-FC98-4FF6-8BD8-36B0722DD112}" type="datetime1">
               <a:rPr lang="zh-TW" altLang="en-US" smtClean="0"/>
-              <a:t>2021/7/9</a:t>
+              <a:t>2021/12/20</a:t>
             </a:fld>
             <a:endParaRPr lang="zh-TW" altLang="en-US"/>
           </a:p>
@@ -1620,7 +1620,7 @@
           <a:p>
             <a:fld id="{FA1795F3-5AF3-4D36-8FB4-F9A58B257DBF}" type="datetime1">
               <a:rPr lang="zh-TW" altLang="en-US" smtClean="0"/>
-              <a:t>2021/7/9</a:t>
+              <a:t>2021/12/20</a:t>
             </a:fld>
             <a:endParaRPr lang="zh-TW" altLang="en-US"/>
           </a:p>
@@ -1885,7 +1885,7 @@
           <a:p>
             <a:fld id="{389249AC-11E8-4D88-8FBA-3D00D61C1209}" type="datetime1">
               <a:rPr lang="zh-TW" altLang="en-US" smtClean="0"/>
-              <a:t>2021/7/9</a:t>
+              <a:t>2021/12/20</a:t>
             </a:fld>
             <a:endParaRPr lang="zh-TW" altLang="en-US"/>
           </a:p>
@@ -2297,7 +2297,7 @@
           <a:p>
             <a:fld id="{1BD7F8EB-3105-4C27-9ED8-5019C3F6169F}" type="datetime1">
               <a:rPr lang="zh-TW" altLang="en-US" smtClean="0"/>
-              <a:t>2021/7/9</a:t>
+              <a:t>2021/12/20</a:t>
             </a:fld>
             <a:endParaRPr lang="zh-TW" altLang="en-US"/>
           </a:p>
@@ -2438,7 +2438,7 @@
           <a:p>
             <a:fld id="{F5DDB88A-BEB7-4AAA-826D-F40D8890EF67}" type="datetime1">
               <a:rPr lang="zh-TW" altLang="en-US" smtClean="0"/>
-              <a:t>2021/7/9</a:t>
+              <a:t>2021/12/20</a:t>
             </a:fld>
             <a:endParaRPr lang="zh-TW" altLang="en-US"/>
           </a:p>
@@ -2551,7 +2551,7 @@
           <a:p>
             <a:fld id="{14DBD7CE-12A9-4F07-AC35-34BE971D6262}" type="datetime1">
               <a:rPr lang="zh-TW" altLang="en-US" smtClean="0"/>
-              <a:t>2021/7/9</a:t>
+              <a:t>2021/12/20</a:t>
             </a:fld>
             <a:endParaRPr lang="zh-TW" altLang="en-US"/>
           </a:p>
@@ -2862,7 +2862,7 @@
           <a:p>
             <a:fld id="{704EE1D1-E941-40DA-8ADC-CA81E0071892}" type="datetime1">
               <a:rPr lang="zh-TW" altLang="en-US" smtClean="0"/>
-              <a:t>2021/7/9</a:t>
+              <a:t>2021/12/20</a:t>
             </a:fld>
             <a:endParaRPr lang="zh-TW" altLang="en-US"/>
           </a:p>
@@ -3150,7 +3150,7 @@
           <a:p>
             <a:fld id="{772FDFF3-CAF9-4AE9-B628-874A7357C4A4}" type="datetime1">
               <a:rPr lang="zh-TW" altLang="en-US" smtClean="0"/>
-              <a:t>2021/7/9</a:t>
+              <a:t>2021/12/20</a:t>
             </a:fld>
             <a:endParaRPr lang="zh-TW" altLang="en-US"/>
           </a:p>
@@ -3391,7 +3391,7 @@
           <a:p>
             <a:fld id="{B6FE77E3-C6F2-4235-A9A2-1BFA8D4D243F}" type="datetime1">
               <a:rPr lang="zh-TW" altLang="en-US" smtClean="0"/>
-              <a:t>2021/7/9</a:t>
+              <a:t>2021/12/20</a:t>
             </a:fld>
             <a:endParaRPr lang="zh-TW" altLang="en-US"/>
           </a:p>
@@ -14413,15 +14413,7 @@
             </a:r>
             <a:r>
               <a:rPr lang="en-US" altLang="zh-TW" dirty="0"/>
-              <a:t>dtd.ntue.edu.tw</a:t>
-            </a:r>
-            <a:r>
-              <a:rPr lang="zh-TW" altLang="en-US" dirty="0"/>
-              <a:t> </a:t>
-            </a:r>
-            <a:r>
-              <a:rPr lang="en-US" altLang="zh-TW" dirty="0"/>
-              <a:t>(</a:t>
+              <a:t> 120.127.14.66(</a:t>
             </a:r>
             <a:r>
               <a:rPr lang="zh-TW" altLang="en-US" dirty="0"/>

</xml_diff>